<commit_message>
adapt slides for CS 536 in the spring
</commit_message>
<xml_diff>
--- a/LectureSlides/0405Parsing.pptx
+++ b/LectureSlides/0405Parsing.pptx
@@ -270,7 +270,7 @@
           <a:p>
             <a:fld id="{10B70E35-B559-4655-B47A-5CF7D55E31D8}" type="datetimeFigureOut">
               <a:rPr lang="en-US" smtClean="0"/>
-              <a:t>10/28/2024</a:t>
+              <a:t>12/20/2024</a:t>
             </a:fld>
             <a:endParaRPr lang="en-US"/>
           </a:p>
@@ -845,7 +845,7 @@
           <a:p>
             <a:fld id="{1A504B2B-6F94-4C13-A423-B13912F19334}" type="datetime1">
               <a:rPr lang="en-US" smtClean="0"/>
-              <a:t>10/28/2024</a:t>
+              <a:t>12/20/2024</a:t>
             </a:fld>
             <a:endParaRPr lang="en-US"/>
           </a:p>
@@ -1053,7 +1053,7 @@
           <a:p>
             <a:fld id="{F391DD72-44BF-4652-84C8-C44BB268C4D1}" type="datetime1">
               <a:rPr lang="en-US" smtClean="0"/>
-              <a:t>10/28/2024</a:t>
+              <a:t>12/20/2024</a:t>
             </a:fld>
             <a:endParaRPr lang="en-US"/>
           </a:p>
@@ -1309,7 +1309,7 @@
           <a:p>
             <a:fld id="{D69CD414-9C96-4888-B68B-BA473E866BE8}" type="datetime1">
               <a:rPr lang="en-US" smtClean="0"/>
-              <a:t>10/28/2024</a:t>
+              <a:t>12/20/2024</a:t>
             </a:fld>
             <a:endParaRPr lang="en-US"/>
           </a:p>
@@ -1494,7 +1494,7 @@
           <a:p>
             <a:fld id="{BDA20522-3DD1-490F-ADA9-E02A72767E77}" type="datetime1">
               <a:rPr lang="en-US" smtClean="0"/>
-              <a:t>10/28/2024</a:t>
+              <a:t>12/20/2024</a:t>
             </a:fld>
             <a:endParaRPr lang="en-US"/>
           </a:p>
@@ -1837,7 +1837,7 @@
           <a:p>
             <a:fld id="{78A16208-8F9E-4F30-B58B-37EEAC5F6899}" type="datetime1">
               <a:rPr lang="en-US" smtClean="0"/>
-              <a:t>10/28/2024</a:t>
+              <a:t>12/20/2024</a:t>
             </a:fld>
             <a:endParaRPr lang="en-US"/>
           </a:p>
@@ -2142,7 +2142,7 @@
           <a:p>
             <a:fld id="{48D28BF1-F9C1-411F-8837-C7F5EA26478C}" type="datetime1">
               <a:rPr lang="en-US" smtClean="0"/>
-              <a:t>10/28/2024</a:t>
+              <a:t>12/20/2024</a:t>
             </a:fld>
             <a:endParaRPr lang="en-US"/>
           </a:p>
@@ -2551,7 +2551,7 @@
           <a:p>
             <a:fld id="{86E63D3A-6C7E-42D9-B53F-BAC924B9BEC6}" type="datetime1">
               <a:rPr lang="en-US" smtClean="0"/>
-              <a:t>10/28/2024</a:t>
+              <a:t>12/20/2024</a:t>
             </a:fld>
             <a:endParaRPr lang="en-US"/>
           </a:p>
@@ -2669,7 +2669,7 @@
           <a:p>
             <a:fld id="{35BF89EB-4F97-4049-B254-F12641F919EF}" type="datetime1">
               <a:rPr lang="en-US" smtClean="0"/>
-              <a:t>10/28/2024</a:t>
+              <a:t>12/20/2024</a:t>
             </a:fld>
             <a:endParaRPr lang="en-US"/>
           </a:p>
@@ -2840,7 +2840,7 @@
           <a:p>
             <a:fld id="{AA709F91-1DF4-444C-945C-73DC540D694E}" type="datetime1">
               <a:rPr lang="en-US" smtClean="0"/>
-              <a:t>10/28/2024</a:t>
+              <a:t>12/20/2024</a:t>
             </a:fld>
             <a:endParaRPr lang="en-US"/>
           </a:p>
@@ -3209,7 +3209,7 @@
           <a:p>
             <a:fld id="{818DA04C-0851-4FC2-A548-19ED04416FA0}" type="datetime1">
               <a:rPr lang="en-US" smtClean="0"/>
-              <a:t>10/28/2024</a:t>
+              <a:t>12/20/2024</a:t>
             </a:fld>
             <a:endParaRPr lang="en-US"/>
           </a:p>
@@ -3586,7 +3586,7 @@
           <a:p>
             <a:fld id="{BD55024B-6E86-4D5D-B578-B88CEB574FA3}" type="datetime1">
               <a:rPr lang="en-US" smtClean="0"/>
-              <a:t>10/28/2024</a:t>
+              <a:t>12/20/2024</a:t>
             </a:fld>
             <a:endParaRPr lang="en-US"/>
           </a:p>
@@ -3873,7 +3873,7 @@
           <a:p>
             <a:fld id="{467B3A33-35DF-4F25-A55B-FD3D9D796E0C}" type="datetime1">
               <a:rPr lang="en-US" smtClean="0"/>
-              <a:t>10/28/2024</a:t>
+              <a:t>12/20/2024</a:t>
             </a:fld>
             <a:endParaRPr lang="en-US"/>
           </a:p>
@@ -4421,7 +4421,7 @@
           <a:p>
             <a:r>
               <a:rPr lang="en-US" dirty="0"/>
-              <a:t>03 - Parsing</a:t>
+              <a:t>04,05 - Parsing</a:t>
             </a:r>
           </a:p>
         </p:txBody>
@@ -4567,7 +4567,7 @@
           <a:p>
             <a:r>
               <a:rPr lang="en-US" dirty="0"/>
-              <a:t>CS 4536 Example Language: Toi*</a:t>
+              <a:t>CS 536 Example Language: Toi*</a:t>
             </a:r>
           </a:p>
         </p:txBody>
@@ -4759,7 +4759,7 @@
           <a:p>
             <a:r>
               <a:rPr lang="en-US" dirty="0"/>
-              <a:t>CS 4536 Example Language: Toi*</a:t>
+              <a:t>CS 536 Example Language: Toi*</a:t>
             </a:r>
           </a:p>
         </p:txBody>
@@ -31567,7 +31567,7 @@
           <a:p>
             <a:r>
               <a:rPr lang="en-US" dirty="0"/>
-              <a:t>Throughout HW 2-4 of CS 4536 we will implement parsing, type-checking, and evaluation for a small example language. We should pick a language</a:t>
+              <a:t>Throughout HW 2-4 of CS 536 we will implement parsing, type-checking, and evaluation for a small example language. We should pick a language</a:t>
             </a:r>
           </a:p>
           <a:p>
@@ -31693,7 +31693,7 @@
           <a:p>
             <a:r>
               <a:rPr lang="en-US" dirty="0"/>
-              <a:t>Throughout HW 2-4 of CS 4536 we will implement parsing, type-checking, and evaluation for a small example language. We should pick a language</a:t>
+              <a:t>Throughout HW 2-4 of CS 536 we will implement parsing, type-checking, and evaluation for a small example language. We should pick a language</a:t>
             </a:r>
           </a:p>
           <a:p>
@@ -31713,7 +31713,7 @@
             </a:r>
             <a:r>
               <a:rPr lang="en-US" dirty="0"/>
-              <a:t> I’m sure some of your answers are not included in CS 4536. You are encouraged to explore such features in the open-ended design exercise part of your homework assignments</a:t>
+              <a:t> I’m sure some of your answers are not included in CS 536. You are encouraged to explore such features in the open-ended design exercise part of your homework assignments</a:t>
             </a:r>
             <a:endParaRPr lang="en-US" b="1" dirty="0"/>
           </a:p>

</xml_diff>